<commit_message>
added new instruction slides
</commit_message>
<xml_diff>
--- a/M3-ExpSpatial/Instructions/Instructions_spatial.pptx
+++ b/M3-ExpSpatial/Instructions/Instructions_spatial.pptx
@@ -415,18 +415,18 @@
   <pc:docChgLst>
     <pc:chgData name="Jan Goettmann" userId="c2e55d6b-0073-4530-a823-558d1fdc99aa" providerId="ADAL" clId="{F885EB0A-33E4-4BFF-ABD4-92EC8EB3B2D7}"/>
     <pc:docChg chg="undo custSel addSld delSld modSld">
-      <pc:chgData name="Jan Goettmann" userId="c2e55d6b-0073-4530-a823-558d1fdc99aa" providerId="ADAL" clId="{F885EB0A-33E4-4BFF-ABD4-92EC8EB3B2D7}" dt="2022-10-17T11:24:33.893" v="2730" actId="20577"/>
+      <pc:chgData name="Jan Goettmann" userId="c2e55d6b-0073-4530-a823-558d1fdc99aa" providerId="ADAL" clId="{F885EB0A-33E4-4BFF-ABD4-92EC8EB3B2D7}" dt="2022-10-17T11:43:51.260" v="2942" actId="114"/>
       <pc:docMkLst>
         <pc:docMk/>
       </pc:docMkLst>
       <pc:sldChg chg="modSp mod">
-        <pc:chgData name="Jan Goettmann" userId="c2e55d6b-0073-4530-a823-558d1fdc99aa" providerId="ADAL" clId="{F885EB0A-33E4-4BFF-ABD4-92EC8EB3B2D7}" dt="2022-10-17T08:15:03.858" v="180" actId="20577"/>
+        <pc:chgData name="Jan Goettmann" userId="c2e55d6b-0073-4530-a823-558d1fdc99aa" providerId="ADAL" clId="{F885EB0A-33E4-4BFF-ABD4-92EC8EB3B2D7}" dt="2022-10-17T11:42:16.102" v="2937" actId="207"/>
         <pc:sldMkLst>
           <pc:docMk/>
           <pc:sldMk cId="747762091" sldId="257"/>
         </pc:sldMkLst>
         <pc:spChg chg="mod">
-          <ac:chgData name="Jan Goettmann" userId="c2e55d6b-0073-4530-a823-558d1fdc99aa" providerId="ADAL" clId="{F885EB0A-33E4-4BFF-ABD4-92EC8EB3B2D7}" dt="2022-10-17T08:15:03.858" v="180" actId="20577"/>
+          <ac:chgData name="Jan Goettmann" userId="c2e55d6b-0073-4530-a823-558d1fdc99aa" providerId="ADAL" clId="{F885EB0A-33E4-4BFF-ABD4-92EC8EB3B2D7}" dt="2022-10-17T11:42:16.102" v="2937" actId="207"/>
           <ac:spMkLst>
             <pc:docMk/>
             <pc:sldMk cId="747762091" sldId="257"/>
@@ -522,7 +522,7 @@
         </pc:cxnChg>
       </pc:sldChg>
       <pc:sldChg chg="addSp delSp modSp mod">
-        <pc:chgData name="Jan Goettmann" userId="c2e55d6b-0073-4530-a823-558d1fdc99aa" providerId="ADAL" clId="{F885EB0A-33E4-4BFF-ABD4-92EC8EB3B2D7}" dt="2022-10-17T09:30:08.728" v="1419" actId="1076"/>
+        <pc:chgData name="Jan Goettmann" userId="c2e55d6b-0073-4530-a823-558d1fdc99aa" providerId="ADAL" clId="{F885EB0A-33E4-4BFF-ABD4-92EC8EB3B2D7}" dt="2022-10-17T11:43:51.260" v="2942" actId="114"/>
         <pc:sldMkLst>
           <pc:docMk/>
           <pc:sldMk cId="3447940044" sldId="261"/>
@@ -1032,7 +1032,7 @@
           </ac:spMkLst>
         </pc:spChg>
         <pc:spChg chg="mod">
-          <ac:chgData name="Jan Goettmann" userId="c2e55d6b-0073-4530-a823-558d1fdc99aa" providerId="ADAL" clId="{F885EB0A-33E4-4BFF-ABD4-92EC8EB3B2D7}" dt="2022-10-17T09:25:37.294" v="1381" actId="20577"/>
+          <ac:chgData name="Jan Goettmann" userId="c2e55d6b-0073-4530-a823-558d1fdc99aa" providerId="ADAL" clId="{F885EB0A-33E4-4BFF-ABD4-92EC8EB3B2D7}" dt="2022-10-17T11:43:51.260" v="2942" actId="114"/>
           <ac:spMkLst>
             <pc:docMk/>
             <pc:sldMk cId="3447940044" sldId="261"/>
@@ -1345,7 +1345,7 @@
         </pc:cxnChg>
       </pc:sldChg>
       <pc:sldChg chg="addSp delSp modSp mod">
-        <pc:chgData name="Jan Goettmann" userId="c2e55d6b-0073-4530-a823-558d1fdc99aa" providerId="ADAL" clId="{F885EB0A-33E4-4BFF-ABD4-92EC8EB3B2D7}" dt="2022-10-17T09:30:50.194" v="1425" actId="1076"/>
+        <pc:chgData name="Jan Goettmann" userId="c2e55d6b-0073-4530-a823-558d1fdc99aa" providerId="ADAL" clId="{F885EB0A-33E4-4BFF-ABD4-92EC8EB3B2D7}" dt="2022-10-17T11:43:40.962" v="2940" actId="1076"/>
         <pc:sldMkLst>
           <pc:docMk/>
           <pc:sldMk cId="4020456500" sldId="262"/>
@@ -1775,7 +1775,7 @@
           </ac:spMkLst>
         </pc:spChg>
         <pc:spChg chg="mod">
-          <ac:chgData name="Jan Goettmann" userId="c2e55d6b-0073-4530-a823-558d1fdc99aa" providerId="ADAL" clId="{F885EB0A-33E4-4BFF-ABD4-92EC8EB3B2D7}" dt="2022-10-17T09:03:01.222" v="1262" actId="1076"/>
+          <ac:chgData name="Jan Goettmann" userId="c2e55d6b-0073-4530-a823-558d1fdc99aa" providerId="ADAL" clId="{F885EB0A-33E4-4BFF-ABD4-92EC8EB3B2D7}" dt="2022-10-17T11:43:40.962" v="2940" actId="1076"/>
           <ac:spMkLst>
             <pc:docMk/>
             <pc:sldMk cId="4020456500" sldId="262"/>
@@ -7734,7 +7734,15 @@
                   <a:schemeClr val="bg1"/>
                 </a:solidFill>
               </a:rPr>
-              <a:t> und die fünfte ein </a:t>
+              <a:t> und </a:t>
+            </a:r>
+            <a:r>
+              <a:rPr lang="de-DE" sz="1600" dirty="0">
+                <a:solidFill>
+                  <a:schemeClr val="bg1"/>
+                </a:solidFill>
+              </a:rPr>
+              <a:t>die fünfte ein </a:t>
             </a:r>
             <a:r>
               <a:rPr lang="de-DE" sz="1600" b="1" i="1" dirty="0">
@@ -24746,8 +24754,8 @@
         </p:nvSpPr>
         <p:spPr>
           <a:xfrm>
-            <a:off x="723900" y="1267051"/>
-            <a:ext cx="10744200" cy="5078313"/>
+            <a:off x="723900" y="1128552"/>
+            <a:ext cx="10744200" cy="5355312"/>
           </a:xfrm>
           <a:prstGeom prst="rect">
             <a:avLst/>
@@ -24877,7 +24885,34 @@
                   <a:srgbClr val="FFC000"/>
                 </a:solidFill>
               </a:rPr>
-              <a:t>müssen Sie ignorieren.</a:t>
+              <a:t>müssen Sie ignorieren. </a:t>
+            </a:r>
+            <a:r>
+              <a:rPr lang="de-DE" dirty="0">
+                <a:solidFill>
+                  <a:schemeClr val="bg1"/>
+                </a:solidFill>
+              </a:rPr>
+              <a:t>Zusätzlich müssen Sie für </a:t>
+            </a:r>
+            <a:r>
+              <a:rPr lang="de-DE" b="1" i="1" dirty="0">
+                <a:solidFill>
+                  <a:srgbClr val="FFC000"/>
+                </a:solidFill>
+              </a:rPr>
+              <a:t>jedes Farbefeld entscheiden,</a:t>
+            </a:r>
+          </a:p>
+          <a:p>
+            <a:pPr algn="ctr"/>
+            <a:r>
+              <a:rPr lang="de-DE" b="1" i="1" dirty="0">
+                <a:solidFill>
+                  <a:srgbClr val="FFC000"/>
+                </a:solidFill>
+              </a:rPr>
+              <a:t>welche gezeigte Farbe die hellere ist !</a:t>
             </a:r>
           </a:p>
           <a:p>
@@ -37982,7 +38017,7 @@
         </p:nvSpPr>
         <p:spPr>
           <a:xfrm>
-            <a:off x="6811720" y="1294944"/>
+            <a:off x="6593072" y="1352204"/>
             <a:ext cx="4396263" cy="4770537"/>
           </a:xfrm>
           <a:prstGeom prst="rect">

</xml_diff>

<commit_message>
bug fixes and timing adjustments
</commit_message>
<xml_diff>
--- a/M3-ExpSpatial/Instructions/Instructions_spatial.pptx
+++ b/M3-ExpSpatial/Instructions/Instructions_spatial.pptx
@@ -415,12 +415,12 @@
   <pc:docChgLst>
     <pc:chgData name="Jan Goettmann" userId="c2e55d6b-0073-4530-a823-558d1fdc99aa" providerId="ADAL" clId="{F885EB0A-33E4-4BFF-ABD4-92EC8EB3B2D7}"/>
     <pc:docChg chg="undo custSel addSld delSld modSld">
-      <pc:chgData name="Jan Goettmann" userId="c2e55d6b-0073-4530-a823-558d1fdc99aa" providerId="ADAL" clId="{F885EB0A-33E4-4BFF-ABD4-92EC8EB3B2D7}" dt="2022-10-25T16:17:40.935" v="3032" actId="478"/>
+      <pc:chgData name="Jan Goettmann" userId="c2e55d6b-0073-4530-a823-558d1fdc99aa" providerId="ADAL" clId="{F885EB0A-33E4-4BFF-ABD4-92EC8EB3B2D7}" dt="2022-11-03T13:39:48.944" v="3033" actId="207"/>
       <pc:docMkLst>
         <pc:docMk/>
       </pc:docMkLst>
       <pc:sldChg chg="addSp delSp modSp mod">
-        <pc:chgData name="Jan Goettmann" userId="c2e55d6b-0073-4530-a823-558d1fdc99aa" providerId="ADAL" clId="{F885EB0A-33E4-4BFF-ABD4-92EC8EB3B2D7}" dt="2022-10-25T16:13:30.777" v="3017"/>
+        <pc:chgData name="Jan Goettmann" userId="c2e55d6b-0073-4530-a823-558d1fdc99aa" providerId="ADAL" clId="{F885EB0A-33E4-4BFF-ABD4-92EC8EB3B2D7}" dt="2022-11-03T13:39:48.944" v="3033" actId="207"/>
         <pc:sldMkLst>
           <pc:docMk/>
           <pc:sldMk cId="764893252" sldId="256"/>
@@ -431,6 +431,14 @@
             <pc:docMk/>
             <pc:sldMk cId="764893252" sldId="256"/>
             <ac:spMk id="2" creationId="{40922984-6D7E-E72A-FC55-C2018AA0DD2B}"/>
+          </ac:spMkLst>
+        </pc:spChg>
+        <pc:spChg chg="mod">
+          <ac:chgData name="Jan Goettmann" userId="c2e55d6b-0073-4530-a823-558d1fdc99aa" providerId="ADAL" clId="{F885EB0A-33E4-4BFF-ABD4-92EC8EB3B2D7}" dt="2022-11-03T13:39:48.944" v="3033" actId="207"/>
+          <ac:spMkLst>
+            <pc:docMk/>
+            <pc:sldMk cId="764893252" sldId="256"/>
+            <ac:spMk id="4" creationId="{E44D2D1F-6A66-651B-DB52-C4F333D46B5C}"/>
           </ac:spMkLst>
         </pc:spChg>
         <pc:spChg chg="del mod">
@@ -4413,7 +4421,7 @@
           <a:p>
             <a:fld id="{45F1D7CE-59CB-49DC-BEA0-F787D0124348}" type="datetimeFigureOut">
               <a:rPr lang="de-DE" smtClean="0"/>
-              <a:t>25.10.2022</a:t>
+              <a:t>03.11.2022</a:t>
             </a:fld>
             <a:endParaRPr lang="de-DE"/>
           </a:p>
@@ -4611,7 +4619,7 @@
           <a:p>
             <a:fld id="{45F1D7CE-59CB-49DC-BEA0-F787D0124348}" type="datetimeFigureOut">
               <a:rPr lang="de-DE" smtClean="0"/>
-              <a:t>25.10.2022</a:t>
+              <a:t>03.11.2022</a:t>
             </a:fld>
             <a:endParaRPr lang="de-DE"/>
           </a:p>
@@ -4819,7 +4827,7 @@
           <a:p>
             <a:fld id="{45F1D7CE-59CB-49DC-BEA0-F787D0124348}" type="datetimeFigureOut">
               <a:rPr lang="de-DE" smtClean="0"/>
-              <a:t>25.10.2022</a:t>
+              <a:t>03.11.2022</a:t>
             </a:fld>
             <a:endParaRPr lang="de-DE"/>
           </a:p>
@@ -5017,7 +5025,7 @@
           <a:p>
             <a:fld id="{45F1D7CE-59CB-49DC-BEA0-F787D0124348}" type="datetimeFigureOut">
               <a:rPr lang="de-DE" smtClean="0"/>
-              <a:t>25.10.2022</a:t>
+              <a:t>03.11.2022</a:t>
             </a:fld>
             <a:endParaRPr lang="de-DE"/>
           </a:p>
@@ -5292,7 +5300,7 @@
           <a:p>
             <a:fld id="{45F1D7CE-59CB-49DC-BEA0-F787D0124348}" type="datetimeFigureOut">
               <a:rPr lang="de-DE" smtClean="0"/>
-              <a:t>25.10.2022</a:t>
+              <a:t>03.11.2022</a:t>
             </a:fld>
             <a:endParaRPr lang="de-DE"/>
           </a:p>
@@ -5557,7 +5565,7 @@
           <a:p>
             <a:fld id="{45F1D7CE-59CB-49DC-BEA0-F787D0124348}" type="datetimeFigureOut">
               <a:rPr lang="de-DE" smtClean="0"/>
-              <a:t>25.10.2022</a:t>
+              <a:t>03.11.2022</a:t>
             </a:fld>
             <a:endParaRPr lang="de-DE"/>
           </a:p>
@@ -5969,7 +5977,7 @@
           <a:p>
             <a:fld id="{45F1D7CE-59CB-49DC-BEA0-F787D0124348}" type="datetimeFigureOut">
               <a:rPr lang="de-DE" smtClean="0"/>
-              <a:t>25.10.2022</a:t>
+              <a:t>03.11.2022</a:t>
             </a:fld>
             <a:endParaRPr lang="de-DE"/>
           </a:p>
@@ -6110,7 +6118,7 @@
           <a:p>
             <a:fld id="{45F1D7CE-59CB-49DC-BEA0-F787D0124348}" type="datetimeFigureOut">
               <a:rPr lang="de-DE" smtClean="0"/>
-              <a:t>25.10.2022</a:t>
+              <a:t>03.11.2022</a:t>
             </a:fld>
             <a:endParaRPr lang="de-DE"/>
           </a:p>
@@ -6223,7 +6231,7 @@
           <a:p>
             <a:fld id="{45F1D7CE-59CB-49DC-BEA0-F787D0124348}" type="datetimeFigureOut">
               <a:rPr lang="de-DE" smtClean="0"/>
-              <a:t>25.10.2022</a:t>
+              <a:t>03.11.2022</a:t>
             </a:fld>
             <a:endParaRPr lang="de-DE"/>
           </a:p>
@@ -6534,7 +6542,7 @@
           <a:p>
             <a:fld id="{45F1D7CE-59CB-49DC-BEA0-F787D0124348}" type="datetimeFigureOut">
               <a:rPr lang="de-DE" smtClean="0"/>
-              <a:t>25.10.2022</a:t>
+              <a:t>03.11.2022</a:t>
             </a:fld>
             <a:endParaRPr lang="de-DE"/>
           </a:p>
@@ -6822,7 +6830,7 @@
           <a:p>
             <a:fld id="{45F1D7CE-59CB-49DC-BEA0-F787D0124348}" type="datetimeFigureOut">
               <a:rPr lang="de-DE" smtClean="0"/>
-              <a:t>25.10.2022</a:t>
+              <a:t>03.11.2022</a:t>
             </a:fld>
             <a:endParaRPr lang="de-DE"/>
           </a:p>
@@ -7063,7 +7071,7 @@
           <a:p>
             <a:fld id="{45F1D7CE-59CB-49DC-BEA0-F787D0124348}" type="datetimeFigureOut">
               <a:rPr lang="de-DE" smtClean="0"/>
-              <a:t>25.10.2022</a:t>
+              <a:t>03.11.2022</a:t>
             </a:fld>
             <a:endParaRPr lang="de-DE"/>
           </a:p>
@@ -7542,7 +7550,7 @@
                   <a:noFill/>
                 </a:ln>
                 <a:solidFill>
-                  <a:prstClr val="white"/>
+                  <a:srgbClr val="FFC000"/>
                 </a:solidFill>
                 <a:effectLst/>
                 <a:uLnTx/>

</xml_diff>